<commit_message>
Minor update to lecture material for week9 of sep101.
</commit_message>
<xml_diff>
--- a/sep101/Week9/ObjectOrientedProgramming.pptx
+++ b/sep101/Week9/ObjectOrientedProgramming.pptx
@@ -301,7 +301,7 @@
             </a:extLst>
           </p:cNvPr>
           <p:cNvSpPr>
-            <a:spLocks noRot="1" noChangeArrowheads="1" noTextEdit="1"/>
+            <a:spLocks noGrp="1" noRot="1" noChangeAspect="1" noChangeArrowheads="1" noTextEdit="1"/>
           </p:cNvSpPr>
           <p:nvPr>
             <p:ph type="sldImg" idx="2"/>
@@ -839,7 +839,7 @@
             </a:extLst>
           </p:cNvPr>
           <p:cNvSpPr>
-            <a:spLocks noRot="1" noChangeArrowheads="1" noTextEdit="1"/>
+            <a:spLocks noGrp="1" noRot="1" noChangeAspect="1" noChangeArrowheads="1" noTextEdit="1"/>
           </p:cNvSpPr>
           <p:nvPr>
             <p:ph type="sldImg"/>
@@ -1097,7 +1097,7 @@
             </a:extLst>
           </p:cNvPr>
           <p:cNvSpPr>
-            <a:spLocks noRot="1" noChangeArrowheads="1" noTextEdit="1"/>
+            <a:spLocks noGrp="1" noRot="1" noChangeAspect="1" noChangeArrowheads="1" noTextEdit="1"/>
           </p:cNvSpPr>
           <p:nvPr>
             <p:ph type="sldImg"/>
@@ -1355,7 +1355,7 @@
             </a:extLst>
           </p:cNvPr>
           <p:cNvSpPr>
-            <a:spLocks noRot="1" noChangeArrowheads="1" noTextEdit="1"/>
+            <a:spLocks noGrp="1" noRot="1" noChangeAspect="1" noChangeArrowheads="1" noTextEdit="1"/>
           </p:cNvSpPr>
           <p:nvPr>
             <p:ph type="sldImg"/>
@@ -1613,7 +1613,7 @@
             </a:extLst>
           </p:cNvPr>
           <p:cNvSpPr>
-            <a:spLocks noRot="1" noChangeArrowheads="1" noTextEdit="1"/>
+            <a:spLocks noGrp="1" noRot="1" noChangeAspect="1" noChangeArrowheads="1" noTextEdit="1"/>
           </p:cNvSpPr>
           <p:nvPr>
             <p:ph type="sldImg"/>
@@ -1871,7 +1871,7 @@
             </a:extLst>
           </p:cNvPr>
           <p:cNvSpPr>
-            <a:spLocks noRot="1" noChangeArrowheads="1" noTextEdit="1"/>
+            <a:spLocks noGrp="1" noRot="1" noChangeAspect="1" noChangeArrowheads="1" noTextEdit="1"/>
           </p:cNvSpPr>
           <p:nvPr>
             <p:ph type="sldImg"/>
@@ -2129,7 +2129,7 @@
             </a:extLst>
           </p:cNvPr>
           <p:cNvSpPr>
-            <a:spLocks noRot="1" noChangeArrowheads="1" noTextEdit="1"/>
+            <a:spLocks noGrp="1" noRot="1" noChangeAspect="1" noChangeArrowheads="1" noTextEdit="1"/>
           </p:cNvSpPr>
           <p:nvPr>
             <p:ph type="sldImg"/>
@@ -2390,7 +2390,7 @@
             </a:extLst>
           </p:cNvPr>
           <p:cNvSpPr>
-            <a:spLocks noRot="1" noChangeArrowheads="1" noTextEdit="1"/>
+            <a:spLocks noGrp="1" noRot="1" noChangeAspect="1" noChangeArrowheads="1" noTextEdit="1"/>
           </p:cNvSpPr>
           <p:nvPr>
             <p:ph type="sldImg"/>
@@ -2648,7 +2648,7 @@
             </a:extLst>
           </p:cNvPr>
           <p:cNvSpPr>
-            <a:spLocks noRot="1" noChangeArrowheads="1" noTextEdit="1"/>
+            <a:spLocks noGrp="1" noRot="1" noChangeAspect="1" noChangeArrowheads="1" noTextEdit="1"/>
           </p:cNvSpPr>
           <p:nvPr>
             <p:ph type="sldImg"/>
@@ -2906,7 +2906,7 @@
             </a:extLst>
           </p:cNvPr>
           <p:cNvSpPr>
-            <a:spLocks noRot="1" noChangeArrowheads="1" noTextEdit="1"/>
+            <a:spLocks noGrp="1" noRot="1" noChangeAspect="1" noChangeArrowheads="1" noTextEdit="1"/>
           </p:cNvSpPr>
           <p:nvPr>
             <p:ph type="sldImg"/>
@@ -3164,7 +3164,7 @@
             </a:extLst>
           </p:cNvPr>
           <p:cNvSpPr>
-            <a:spLocks noRot="1" noChangeArrowheads="1" noTextEdit="1"/>
+            <a:spLocks noGrp="1" noRot="1" noChangeAspect="1" noChangeArrowheads="1" noTextEdit="1"/>
           </p:cNvSpPr>
           <p:nvPr>
             <p:ph type="sldImg"/>
@@ -3422,7 +3422,7 @@
             </a:extLst>
           </p:cNvPr>
           <p:cNvSpPr>
-            <a:spLocks noRot="1" noChangeArrowheads="1" noTextEdit="1"/>
+            <a:spLocks noGrp="1" noRot="1" noChangeAspect="1" noChangeArrowheads="1" noTextEdit="1"/>
           </p:cNvSpPr>
           <p:nvPr>
             <p:ph type="sldImg"/>
@@ -3680,7 +3680,7 @@
             </a:extLst>
           </p:cNvPr>
           <p:cNvSpPr>
-            <a:spLocks noRot="1" noChangeArrowheads="1" noTextEdit="1"/>
+            <a:spLocks noGrp="1" noRot="1" noChangeAspect="1" noChangeArrowheads="1" noTextEdit="1"/>
           </p:cNvSpPr>
           <p:nvPr>
             <p:ph type="sldImg"/>
@@ -8088,11 +8088,11 @@
           <a:p>
             <a:pPr algn="l"/>
             <a:r>
-              <a:rPr lang="en-CA" altLang="en-US" sz="1400"/>
+              <a:rPr lang="en-CA" altLang="en-US" sz="1400" dirty="0"/>
               <a:t> </a:t>
             </a:r>
             <a:r>
-              <a:rPr lang="en-US" altLang="en-US" sz="1400">
+              <a:rPr lang="en-US" altLang="en-US" sz="1400" dirty="0">
                 <a:solidFill>
                   <a:srgbClr val="0000FF"/>
                 </a:solidFill>
@@ -8101,7 +8101,7 @@
               <a:t>int</a:t>
             </a:r>
             <a:r>
-              <a:rPr lang="en-US" altLang="en-US" sz="1400">
+              <a:rPr lang="en-US" altLang="en-US" sz="1400" dirty="0">
                 <a:solidFill>
                   <a:srgbClr val="000000"/>
                 </a:solidFill>
@@ -8110,7 +8110,7 @@
               <a:t> main()</a:t>
             </a:r>
             <a:br>
-              <a:rPr lang="en-US" altLang="en-US" sz="1400">
+              <a:rPr lang="en-US" altLang="en-US" sz="1400" dirty="0">
                 <a:solidFill>
                   <a:srgbClr val="000000"/>
                 </a:solidFill>
@@ -8118,7 +8118,7 @@
               </a:rPr>
             </a:br>
             <a:r>
-              <a:rPr lang="en-US" altLang="en-US" sz="1400">
+              <a:rPr lang="en-US" altLang="en-US" sz="1400" dirty="0">
                 <a:solidFill>
                   <a:srgbClr val="000000"/>
                 </a:solidFill>
@@ -8127,7 +8127,7 @@
               <a:t>{</a:t>
             </a:r>
             <a:br>
-              <a:rPr lang="en-US" altLang="en-US" sz="1400">
+              <a:rPr lang="en-US" altLang="en-US" sz="1400" dirty="0">
                 <a:solidFill>
                   <a:srgbClr val="000000"/>
                 </a:solidFill>
@@ -8135,7 +8135,7 @@
               </a:rPr>
             </a:br>
             <a:r>
-              <a:rPr lang="it-IT" altLang="en-US" sz="1400">
+              <a:rPr lang="it-IT" altLang="en-US" sz="1400" dirty="0">
                 <a:solidFill>
                   <a:srgbClr val="000000"/>
                 </a:solidFill>
@@ -8144,7 +8144,7 @@
               <a:t>    </a:t>
             </a:r>
             <a:r>
-              <a:rPr lang="it-IT" altLang="en-US" sz="1400">
+              <a:rPr lang="it-IT" altLang="en-US" sz="1400" dirty="0">
                 <a:solidFill>
                   <a:srgbClr val="2B91AF"/>
                 </a:solidFill>
@@ -8153,7 +8153,7 @@
               <a:t>Automobile</a:t>
             </a:r>
             <a:r>
-              <a:rPr lang="it-IT" altLang="en-US" sz="1400">
+              <a:rPr lang="it-IT" altLang="en-US" sz="1400" dirty="0">
                 <a:solidFill>
                   <a:srgbClr val="000000"/>
                 </a:solidFill>
@@ -8162,7 +8162,7 @@
               <a:t> car1(</a:t>
             </a:r>
             <a:r>
-              <a:rPr lang="it-IT" altLang="en-US" sz="1400">
+              <a:rPr lang="it-IT" altLang="en-US" sz="1400" dirty="0">
                 <a:solidFill>
                   <a:srgbClr val="A31515"/>
                 </a:solidFill>
@@ -8171,7 +8171,7 @@
               <a:t>"Toyota"</a:t>
             </a:r>
             <a:r>
-              <a:rPr lang="it-IT" altLang="en-US" sz="1400">
+              <a:rPr lang="it-IT" altLang="en-US" sz="1400" dirty="0">
                 <a:solidFill>
                   <a:srgbClr val="000000"/>
                 </a:solidFill>
@@ -8180,7 +8180,7 @@
               <a:t>, </a:t>
             </a:r>
             <a:r>
-              <a:rPr lang="it-IT" altLang="en-US" sz="1400">
+              <a:rPr lang="it-IT" altLang="en-US" sz="1400" dirty="0">
                 <a:solidFill>
                   <a:srgbClr val="A31515"/>
                 </a:solidFill>
@@ -8189,7 +8189,7 @@
               <a:t>"Corolla"</a:t>
             </a:r>
             <a:r>
-              <a:rPr lang="it-IT" altLang="en-US" sz="1400">
+              <a:rPr lang="it-IT" altLang="en-US" sz="1400" dirty="0">
                 <a:solidFill>
                   <a:srgbClr val="000000"/>
                 </a:solidFill>
@@ -8198,7 +8198,7 @@
               <a:t>, </a:t>
             </a:r>
             <a:r>
-              <a:rPr lang="it-IT" altLang="en-US" sz="1400">
+              <a:rPr lang="it-IT" altLang="en-US" sz="1400" dirty="0">
                 <a:solidFill>
                   <a:srgbClr val="A31515"/>
                 </a:solidFill>
@@ -8207,7 +8207,7 @@
               <a:t>"grey"</a:t>
             </a:r>
             <a:r>
-              <a:rPr lang="it-IT" altLang="en-US" sz="1400">
+              <a:rPr lang="it-IT" altLang="en-US" sz="1400" dirty="0">
                 <a:solidFill>
                   <a:srgbClr val="000000"/>
                 </a:solidFill>
@@ -8216,7 +8216,7 @@
               <a:t>, 2013);</a:t>
             </a:r>
             <a:br>
-              <a:rPr lang="it-IT" altLang="en-US" sz="1400">
+              <a:rPr lang="it-IT" altLang="en-US" sz="1400" dirty="0">
                 <a:solidFill>
                   <a:srgbClr val="000000"/>
                 </a:solidFill>
@@ -8224,7 +8224,7 @@
               </a:rPr>
             </a:br>
             <a:r>
-              <a:rPr lang="en-US" altLang="en-US" sz="1400">
+              <a:rPr lang="en-US" altLang="en-US" sz="1400" dirty="0">
                 <a:solidFill>
                   <a:srgbClr val="000000"/>
                 </a:solidFill>
@@ -8233,7 +8233,7 @@
               <a:t>    </a:t>
             </a:r>
             <a:r>
-              <a:rPr lang="en-US" altLang="en-US" sz="1400">
+              <a:rPr lang="en-US" altLang="en-US" sz="1400" dirty="0">
                 <a:solidFill>
                   <a:srgbClr val="2B91AF"/>
                 </a:solidFill>
@@ -8242,7 +8242,7 @@
               <a:t>Automobile</a:t>
             </a:r>
             <a:r>
-              <a:rPr lang="en-US" altLang="en-US" sz="1400">
+              <a:rPr lang="en-US" altLang="en-US" sz="1400" dirty="0">
                 <a:solidFill>
                   <a:srgbClr val="000000"/>
                 </a:solidFill>
@@ -8251,7 +8251,7 @@
               <a:t> car2(</a:t>
             </a:r>
             <a:r>
-              <a:rPr lang="en-US" altLang="en-US" sz="1400">
+              <a:rPr lang="en-US" altLang="en-US" sz="1400" dirty="0">
                 <a:solidFill>
                   <a:srgbClr val="A31515"/>
                 </a:solidFill>
@@ -8260,7 +8260,7 @@
               <a:t>"Honda"</a:t>
             </a:r>
             <a:r>
-              <a:rPr lang="en-US" altLang="en-US" sz="1400">
+              <a:rPr lang="en-US" altLang="en-US" sz="1400" dirty="0">
                 <a:solidFill>
                   <a:srgbClr val="000000"/>
                 </a:solidFill>
@@ -8269,7 +8269,7 @@
               <a:t>, </a:t>
             </a:r>
             <a:r>
-              <a:rPr lang="en-US" altLang="en-US" sz="1400">
+              <a:rPr lang="en-US" altLang="en-US" sz="1400" dirty="0">
                 <a:solidFill>
                   <a:srgbClr val="A31515"/>
                 </a:solidFill>
@@ -8278,7 +8278,7 @@
               <a:t>"Civic"</a:t>
             </a:r>
             <a:r>
-              <a:rPr lang="en-US" altLang="en-US" sz="1400">
+              <a:rPr lang="en-US" altLang="en-US" sz="1400" dirty="0">
                 <a:solidFill>
                   <a:srgbClr val="000000"/>
                 </a:solidFill>
@@ -8287,7 +8287,7 @@
               <a:t>, </a:t>
             </a:r>
             <a:r>
-              <a:rPr lang="en-US" altLang="en-US" sz="1400">
+              <a:rPr lang="en-US" altLang="en-US" sz="1400" dirty="0">
                 <a:solidFill>
                   <a:srgbClr val="A31515"/>
                 </a:solidFill>
@@ -8296,7 +8296,7 @@
               <a:t>"red"</a:t>
             </a:r>
             <a:r>
-              <a:rPr lang="en-US" altLang="en-US" sz="1400">
+              <a:rPr lang="en-US" altLang="en-US" sz="1400" dirty="0">
                 <a:solidFill>
                   <a:srgbClr val="000000"/>
                 </a:solidFill>
@@ -8305,7 +8305,7 @@
               <a:t>, 2012);</a:t>
             </a:r>
             <a:br>
-              <a:rPr lang="en-US" altLang="en-US" sz="1400">
+              <a:rPr lang="en-US" altLang="en-US" sz="1400" dirty="0">
                 <a:solidFill>
                   <a:srgbClr val="000000"/>
                 </a:solidFill>
@@ -8313,7 +8313,7 @@
               </a:rPr>
             </a:br>
             <a:br>
-              <a:rPr lang="en-US" altLang="en-US" sz="1400">
+              <a:rPr lang="en-US" altLang="en-US" sz="1400" dirty="0">
                 <a:solidFill>
                   <a:srgbClr val="000000"/>
                 </a:solidFill>
@@ -8327,10 +8327,19 @@
                 </a:solidFill>
                 <a:latin typeface="Consolas" panose="020B0609020204030204" pitchFamily="49" charset="0"/>
               </a:rPr>
-              <a:t>    car1-&gt;addFuel(50.0);</a:t>
+              <a:t>    car1.addFuel</a:t>
+            </a:r>
+            <a:r>
+              <a:rPr lang="en-US" altLang="en-US" sz="1400" dirty="0">
+                <a:solidFill>
+                  <a:srgbClr val="000000"/>
+                </a:solidFill>
+                <a:latin typeface="Consolas" panose="020B0609020204030204" pitchFamily="49" charset="0"/>
+              </a:rPr>
+              <a:t>(50.0);</a:t>
             </a:r>
             <a:br>
-              <a:rPr lang="en-US" altLang="en-US" sz="1400">
+              <a:rPr lang="en-US" altLang="en-US" sz="1400" dirty="0">
                 <a:solidFill>
                   <a:srgbClr val="000000"/>
                 </a:solidFill>
@@ -8344,10 +8353,19 @@
                 </a:solidFill>
                 <a:latin typeface="Consolas" panose="020B0609020204030204" pitchFamily="49" charset="0"/>
               </a:rPr>
-              <a:t>    car2-&gt;addFuel(50.0);</a:t>
+              <a:t>    car2.addFuel</a:t>
+            </a:r>
+            <a:r>
+              <a:rPr lang="en-US" altLang="en-US" sz="1400" dirty="0">
+                <a:solidFill>
+                  <a:srgbClr val="000000"/>
+                </a:solidFill>
+                <a:latin typeface="Consolas" panose="020B0609020204030204" pitchFamily="49" charset="0"/>
+              </a:rPr>
+              <a:t>(50.0);</a:t>
             </a:r>
             <a:br>
-              <a:rPr lang="en-US" altLang="en-US" sz="1400">
+              <a:rPr lang="en-US" altLang="en-US" sz="1400" dirty="0">
                 <a:solidFill>
                   <a:srgbClr val="000000"/>
                 </a:solidFill>
@@ -8355,7 +8373,7 @@
               </a:rPr>
             </a:br>
             <a:br>
-              <a:rPr lang="en-US" altLang="en-US" sz="1400">
+              <a:rPr lang="en-US" altLang="en-US" sz="1400" dirty="0">
                 <a:solidFill>
                   <a:srgbClr val="000000"/>
                 </a:solidFill>
@@ -8363,7 +8381,7 @@
               </a:rPr>
             </a:br>
             <a:r>
-              <a:rPr lang="en-US" altLang="en-US" sz="1400">
+              <a:rPr lang="en-US" altLang="en-US" sz="1400" dirty="0">
                 <a:solidFill>
                   <a:srgbClr val="000000"/>
                 </a:solidFill>
@@ -8372,7 +8390,7 @@
               <a:t>    </a:t>
             </a:r>
             <a:r>
-              <a:rPr lang="en-US" altLang="en-US" sz="1400">
+              <a:rPr lang="en-US" altLang="en-US" sz="1400" dirty="0">
                 <a:solidFill>
                   <a:srgbClr val="008000"/>
                 </a:solidFill>
@@ -8381,7 +8399,7 @@
               <a:t>//Set fuel efficiency for city driving then drive 200km</a:t>
             </a:r>
             <a:br>
-              <a:rPr lang="en-US" altLang="en-US" sz="1400">
+              <a:rPr lang="en-US" altLang="en-US" sz="1400" dirty="0">
                 <a:solidFill>
                   <a:srgbClr val="000000"/>
                 </a:solidFill>
@@ -8389,16 +8407,16 @@
               </a:rPr>
             </a:br>
             <a:r>
-              <a:rPr lang="en-US" altLang="en-US" sz="1400">
-                <a:solidFill>
-                  <a:srgbClr val="000000"/>
-                </a:solidFill>
-                <a:latin typeface="Consolas" panose="020B0609020204030204" pitchFamily="49" charset="0"/>
-              </a:rPr>
-              <a:t>    car1-&gt;setFuelEfficiency(8.2);</a:t>
+              <a:rPr lang="en-US" altLang="en-US" sz="1400" dirty="0">
+                <a:solidFill>
+                  <a:srgbClr val="000000"/>
+                </a:solidFill>
+                <a:latin typeface="Consolas" panose="020B0609020204030204" pitchFamily="49" charset="0"/>
+              </a:rPr>
+              <a:t>    car1.setFuelEfficiency(8.2);</a:t>
             </a:r>
             <a:br>
-              <a:rPr lang="en-US" altLang="en-US" sz="1400">
+              <a:rPr lang="en-US" altLang="en-US" sz="1400" dirty="0">
                 <a:solidFill>
                   <a:srgbClr val="000000"/>
                 </a:solidFill>
@@ -8406,16 +8424,16 @@
               </a:rPr>
             </a:br>
             <a:r>
-              <a:rPr lang="en-US" altLang="en-US" sz="1400">
-                <a:solidFill>
-                  <a:srgbClr val="000000"/>
-                </a:solidFill>
-                <a:latin typeface="Consolas" panose="020B0609020204030204" pitchFamily="49" charset="0"/>
-              </a:rPr>
-              <a:t>    car1-&gt;drive(200.0);</a:t>
+              <a:rPr lang="en-US" altLang="en-US" sz="1400" dirty="0">
+                <a:solidFill>
+                  <a:srgbClr val="000000"/>
+                </a:solidFill>
+                <a:latin typeface="Consolas" panose="020B0609020204030204" pitchFamily="49" charset="0"/>
+              </a:rPr>
+              <a:t>    car1.drive(200.0);</a:t>
             </a:r>
             <a:br>
-              <a:rPr lang="en-US" altLang="en-US" sz="1400">
+              <a:rPr lang="en-US" altLang="en-US" sz="1400" dirty="0">
                 <a:solidFill>
                   <a:srgbClr val="000000"/>
                 </a:solidFill>
@@ -8423,16 +8441,16 @@
               </a:rPr>
             </a:br>
             <a:r>
-              <a:rPr lang="en-US" altLang="en-US" sz="1400">
-                <a:solidFill>
-                  <a:srgbClr val="000000"/>
-                </a:solidFill>
-                <a:latin typeface="Consolas" panose="020B0609020204030204" pitchFamily="49" charset="0"/>
-              </a:rPr>
-              <a:t>    car2-&gt;setFuelEfficiency(7.8);</a:t>
+              <a:rPr lang="en-US" altLang="en-US" sz="1400" dirty="0">
+                <a:solidFill>
+                  <a:srgbClr val="000000"/>
+                </a:solidFill>
+                <a:latin typeface="Consolas" panose="020B0609020204030204" pitchFamily="49" charset="0"/>
+              </a:rPr>
+              <a:t>    car2.setFuelEfficiency(7.8);</a:t>
             </a:r>
             <a:br>
-              <a:rPr lang="en-US" altLang="en-US" sz="1400">
+              <a:rPr lang="en-US" altLang="en-US" sz="1400" dirty="0">
                 <a:solidFill>
                   <a:srgbClr val="000000"/>
                 </a:solidFill>
@@ -8440,16 +8458,16 @@
               </a:rPr>
             </a:br>
             <a:r>
-              <a:rPr lang="en-US" altLang="en-US" sz="1400">
-                <a:solidFill>
-                  <a:srgbClr val="000000"/>
-                </a:solidFill>
-                <a:latin typeface="Consolas" panose="020B0609020204030204" pitchFamily="49" charset="0"/>
-              </a:rPr>
-              <a:t>    car2-&gt;drive(200.0);</a:t>
+              <a:rPr lang="en-US" altLang="en-US" sz="1400" dirty="0">
+                <a:solidFill>
+                  <a:srgbClr val="000000"/>
+                </a:solidFill>
+                <a:latin typeface="Consolas" panose="020B0609020204030204" pitchFamily="49" charset="0"/>
+              </a:rPr>
+              <a:t>    car2.drive(200.0);</a:t>
             </a:r>
             <a:br>
-              <a:rPr lang="en-US" altLang="en-US" sz="1400">
+              <a:rPr lang="en-US" altLang="en-US" sz="1400" dirty="0">
                 <a:solidFill>
                   <a:srgbClr val="000000"/>
                 </a:solidFill>
@@ -8457,7 +8475,7 @@
               </a:rPr>
             </a:br>
             <a:br>
-              <a:rPr lang="en-US" altLang="en-US" sz="1400">
+              <a:rPr lang="en-US" altLang="en-US" sz="1400" dirty="0">
                 <a:solidFill>
                   <a:srgbClr val="000000"/>
                 </a:solidFill>
@@ -8465,7 +8483,7 @@
               </a:rPr>
             </a:br>
             <a:r>
-              <a:rPr lang="en-US" altLang="en-US" sz="1400">
+              <a:rPr lang="en-US" altLang="en-US" sz="1400" dirty="0">
                 <a:solidFill>
                   <a:srgbClr val="000000"/>
                 </a:solidFill>
@@ -8474,7 +8492,7 @@
               <a:t>    </a:t>
             </a:r>
             <a:r>
-              <a:rPr lang="en-US" altLang="en-US" sz="1400">
+              <a:rPr lang="en-US" altLang="en-US" sz="1400" dirty="0">
                 <a:solidFill>
                   <a:srgbClr val="008000"/>
                 </a:solidFill>
@@ -8483,7 +8501,7 @@
               <a:t>//Set fuel efficiency for highway driving then drive 300km</a:t>
             </a:r>
             <a:br>
-              <a:rPr lang="en-US" altLang="en-US" sz="1400">
+              <a:rPr lang="en-US" altLang="en-US" sz="1400" dirty="0">
                 <a:solidFill>
                   <a:srgbClr val="000000"/>
                 </a:solidFill>
@@ -8491,16 +8509,16 @@
               </a:rPr>
             </a:br>
             <a:r>
-              <a:rPr lang="en-US" altLang="en-US" sz="1400">
-                <a:solidFill>
-                  <a:srgbClr val="000000"/>
-                </a:solidFill>
-                <a:latin typeface="Consolas" panose="020B0609020204030204" pitchFamily="49" charset="0"/>
-              </a:rPr>
-              <a:t>    car1-&gt;setFuelEfficiency(6.2);</a:t>
+              <a:rPr lang="en-US" altLang="en-US" sz="1400" dirty="0">
+                <a:solidFill>
+                  <a:srgbClr val="000000"/>
+                </a:solidFill>
+                <a:latin typeface="Consolas" panose="020B0609020204030204" pitchFamily="49" charset="0"/>
+              </a:rPr>
+              <a:t>    car1.setFuelEfficiency(6.2);</a:t>
             </a:r>
             <a:br>
-              <a:rPr lang="en-US" altLang="en-US" sz="1400">
+              <a:rPr lang="en-US" altLang="en-US" sz="1400" dirty="0">
                 <a:solidFill>
                   <a:srgbClr val="000000"/>
                 </a:solidFill>
@@ -8508,16 +8526,16 @@
               </a:rPr>
             </a:br>
             <a:r>
-              <a:rPr lang="en-US" altLang="en-US" sz="1400">
-                <a:solidFill>
-                  <a:srgbClr val="000000"/>
-                </a:solidFill>
-                <a:latin typeface="Consolas" panose="020B0609020204030204" pitchFamily="49" charset="0"/>
-              </a:rPr>
-              <a:t>    car1-&gt;drive(300.0);</a:t>
+              <a:rPr lang="en-US" altLang="en-US" sz="1400" dirty="0">
+                <a:solidFill>
+                  <a:srgbClr val="000000"/>
+                </a:solidFill>
+                <a:latin typeface="Consolas" panose="020B0609020204030204" pitchFamily="49" charset="0"/>
+              </a:rPr>
+              <a:t>    car1.drive(300.0);</a:t>
             </a:r>
             <a:br>
-              <a:rPr lang="en-US" altLang="en-US" sz="1400">
+              <a:rPr lang="en-US" altLang="en-US" sz="1400" dirty="0">
                 <a:solidFill>
                   <a:srgbClr val="000000"/>
                 </a:solidFill>
@@ -8525,16 +8543,16 @@
               </a:rPr>
             </a:br>
             <a:r>
-              <a:rPr lang="en-US" altLang="en-US" sz="1400">
-                <a:solidFill>
-                  <a:srgbClr val="000000"/>
-                </a:solidFill>
-                <a:latin typeface="Consolas" panose="020B0609020204030204" pitchFamily="49" charset="0"/>
-              </a:rPr>
-              <a:t>    car2-&gt;setFuelEfficiency(5.8);</a:t>
+              <a:rPr lang="en-US" altLang="en-US" sz="1400" dirty="0">
+                <a:solidFill>
+                  <a:srgbClr val="000000"/>
+                </a:solidFill>
+                <a:latin typeface="Consolas" panose="020B0609020204030204" pitchFamily="49" charset="0"/>
+              </a:rPr>
+              <a:t>    car2.setFuelEfficiency(5.8);</a:t>
             </a:r>
             <a:br>
-              <a:rPr lang="en-US" altLang="en-US" sz="1400">
+              <a:rPr lang="en-US" altLang="en-US" sz="1400" dirty="0">
                 <a:solidFill>
                   <a:srgbClr val="000000"/>
                 </a:solidFill>
@@ -8542,16 +8560,16 @@
               </a:rPr>
             </a:br>
             <a:r>
-              <a:rPr lang="en-US" altLang="en-US" sz="1400">
-                <a:solidFill>
-                  <a:srgbClr val="000000"/>
-                </a:solidFill>
-                <a:latin typeface="Consolas" panose="020B0609020204030204" pitchFamily="49" charset="0"/>
-              </a:rPr>
-              <a:t>    car2-&gt;drive(300.0);</a:t>
+              <a:rPr lang="en-US" altLang="en-US" sz="1400" dirty="0">
+                <a:solidFill>
+                  <a:srgbClr val="000000"/>
+                </a:solidFill>
+                <a:latin typeface="Consolas" panose="020B0609020204030204" pitchFamily="49" charset="0"/>
+              </a:rPr>
+              <a:t>    car2.drive(300.0);</a:t>
             </a:r>
             <a:br>
-              <a:rPr lang="en-US" altLang="en-US" sz="1400">
+              <a:rPr lang="en-US" altLang="en-US" sz="1400" dirty="0">
                 <a:solidFill>
                   <a:srgbClr val="000000"/>
                 </a:solidFill>
@@ -8559,7 +8577,7 @@
               </a:rPr>
             </a:br>
             <a:br>
-              <a:rPr lang="en-US" altLang="en-US" sz="1400">
+              <a:rPr lang="en-US" altLang="en-US" sz="1400" dirty="0">
                 <a:solidFill>
                   <a:srgbClr val="000000"/>
                 </a:solidFill>
@@ -8567,7 +8585,7 @@
               </a:rPr>
             </a:br>
             <a:r>
-              <a:rPr lang="en-US" altLang="en-US" sz="1400">
+              <a:rPr lang="en-US" altLang="en-US" sz="1400" dirty="0">
                 <a:solidFill>
                   <a:srgbClr val="000000"/>
                 </a:solidFill>
@@ -8576,7 +8594,7 @@
               <a:t>    </a:t>
             </a:r>
             <a:r>
-              <a:rPr lang="en-US" altLang="en-US" sz="1400">
+              <a:rPr lang="en-US" altLang="en-US" sz="1400" dirty="0">
                 <a:solidFill>
                   <a:srgbClr val="008000"/>
                 </a:solidFill>
@@ -8585,7 +8603,7 @@
               <a:t>//display the results</a:t>
             </a:r>
             <a:br>
-              <a:rPr lang="en-US" altLang="en-US" sz="1400">
+              <a:rPr lang="en-US" altLang="en-US" sz="1400" dirty="0">
                 <a:solidFill>
                   <a:srgbClr val="000000"/>
                 </a:solidFill>
@@ -8593,16 +8611,16 @@
               </a:rPr>
             </a:br>
             <a:r>
-              <a:rPr lang="en-US" altLang="en-US" sz="1400">
-                <a:solidFill>
-                  <a:srgbClr val="000000"/>
-                </a:solidFill>
-                <a:latin typeface="Consolas" panose="020B0609020204030204" pitchFamily="49" charset="0"/>
-              </a:rPr>
-              <a:t>    car1-&gt;displayReport();</a:t>
+              <a:rPr lang="en-US" altLang="en-US" sz="1400" dirty="0">
+                <a:solidFill>
+                  <a:srgbClr val="000000"/>
+                </a:solidFill>
+                <a:latin typeface="Consolas" panose="020B0609020204030204" pitchFamily="49" charset="0"/>
+              </a:rPr>
+              <a:t>    car1.displayReport();</a:t>
             </a:r>
             <a:br>
-              <a:rPr lang="en-US" altLang="en-US" sz="1400">
+              <a:rPr lang="en-US" altLang="en-US" sz="1400" dirty="0">
                 <a:solidFill>
                   <a:srgbClr val="000000"/>
                 </a:solidFill>
@@ -8610,16 +8628,16 @@
               </a:rPr>
             </a:br>
             <a:r>
-              <a:rPr lang="en-US" altLang="en-US" sz="1400">
-                <a:solidFill>
-                  <a:srgbClr val="000000"/>
-                </a:solidFill>
-                <a:latin typeface="Consolas" panose="020B0609020204030204" pitchFamily="49" charset="0"/>
-              </a:rPr>
-              <a:t>    car2-&gt;displayReport();</a:t>
+              <a:rPr lang="en-US" altLang="en-US" sz="1400" dirty="0">
+                <a:solidFill>
+                  <a:srgbClr val="000000"/>
+                </a:solidFill>
+                <a:latin typeface="Consolas" panose="020B0609020204030204" pitchFamily="49" charset="0"/>
+              </a:rPr>
+              <a:t>    car2.displayReport();</a:t>
             </a:r>
             <a:br>
-              <a:rPr lang="en-US" altLang="en-US" sz="1400">
+              <a:rPr lang="en-US" altLang="en-US" sz="1400" dirty="0">
                 <a:solidFill>
                   <a:srgbClr val="000000"/>
                 </a:solidFill>
@@ -8627,7 +8645,7 @@
               </a:rPr>
             </a:br>
             <a:br>
-              <a:rPr lang="en-US" altLang="en-US" sz="1400">
+              <a:rPr lang="en-US" altLang="en-US" sz="1400" dirty="0">
                 <a:solidFill>
                   <a:srgbClr val="000000"/>
                 </a:solidFill>
@@ -8635,7 +8653,7 @@
               </a:rPr>
             </a:br>
             <a:r>
-              <a:rPr lang="en-US" altLang="en-US" sz="1400">
+              <a:rPr lang="en-US" altLang="en-US" sz="1400" dirty="0">
                 <a:solidFill>
                   <a:srgbClr val="000000"/>
                 </a:solidFill>
@@ -8644,7 +8662,7 @@
               <a:t>    </a:t>
             </a:r>
             <a:r>
-              <a:rPr lang="en-US" altLang="en-US" sz="1400">
+              <a:rPr lang="en-US" altLang="en-US" sz="1400" dirty="0">
                 <a:solidFill>
                   <a:srgbClr val="0000FF"/>
                 </a:solidFill>
@@ -8653,7 +8671,7 @@
               <a:t>return</a:t>
             </a:r>
             <a:r>
-              <a:rPr lang="en-US" altLang="en-US" sz="1400">
+              <a:rPr lang="en-US" altLang="en-US" sz="1400" dirty="0">
                 <a:solidFill>
                   <a:srgbClr val="000000"/>
                 </a:solidFill>
@@ -8662,7 +8680,7 @@
               <a:t> 0;</a:t>
             </a:r>
             <a:br>
-              <a:rPr lang="en-US" altLang="en-US" sz="1400">
+              <a:rPr lang="en-US" altLang="en-US" sz="1400" dirty="0">
                 <a:solidFill>
                   <a:srgbClr val="000000"/>
                 </a:solidFill>
@@ -8670,7 +8688,7 @@
               </a:rPr>
             </a:br>
             <a:r>
-              <a:rPr lang="en-US" altLang="en-US" sz="1400">
+              <a:rPr lang="en-US" altLang="en-US" sz="1400" dirty="0">
                 <a:solidFill>
                   <a:srgbClr val="000000"/>
                 </a:solidFill>
@@ -8679,24 +8697,24 @@
               <a:t>}</a:t>
             </a:r>
             <a:br>
-              <a:rPr lang="en-CA" altLang="en-US" sz="1400"/>
+              <a:rPr lang="en-CA" altLang="en-US" sz="1400" dirty="0"/>
             </a:br>
             <a:r>
-              <a:rPr lang="en-CA" altLang="en-US" sz="1400"/>
+              <a:rPr lang="en-CA" altLang="en-US" sz="1400" dirty="0"/>
               <a:t>============ Results ===========</a:t>
             </a:r>
             <a:br>
-              <a:rPr lang="en-CA" altLang="en-US" sz="1400"/>
+              <a:rPr lang="en-CA" altLang="en-US" sz="1400" dirty="0"/>
             </a:br>
             <a:r>
-              <a:rPr lang="en-CA" altLang="en-US" sz="1400"/>
+              <a:rPr lang="en-CA" altLang="en-US" sz="1400" dirty="0"/>
               <a:t>The grey 2013 Toyota Corolla has 15.00 liters left in the tank</a:t>
             </a:r>
             <a:br>
-              <a:rPr lang="en-CA" altLang="en-US" sz="1400"/>
+              <a:rPr lang="en-CA" altLang="en-US" sz="1400" dirty="0"/>
             </a:br>
             <a:r>
-              <a:rPr lang="en-CA" altLang="en-US" sz="1400"/>
+              <a:rPr lang="en-CA" altLang="en-US" sz="1400" dirty="0"/>
               <a:t>The red 2012 Honda Civic has 17.00 liters left in the tank</a:t>
             </a:r>
           </a:p>

</xml_diff>